<commit_message>
* invitation task: renamed module 2- 2a, 2a-2b.
</commit_message>
<xml_diff>
--- a/public/js/tasks/invitation_task/media/Invitation_Task_Instructions.02.13.2022.pptx
+++ b/public/js/tasks/invitation_task/media/Invitation_Task_Instructions.02.13.2022.pptx
@@ -122,12 +122,12 @@
             <p14:sldId id="498"/>
           </p14:sldIdLst>
         </p14:section>
-        <p14:section name="Practice Run 2" id="{C4B76CCF-7332-F34B-A8DB-92C81D38FB3A}">
+        <p14:section name="Practice Run 2a" id="{C4B76CCF-7332-F34B-A8DB-92C81D38FB3A}">
           <p14:sldIdLst>
             <p14:sldId id="556"/>
           </p14:sldIdLst>
         </p14:section>
-        <p14:section name="Practice Run 2a" id="{CAC7A062-AB6D-0345-9A4E-DC6A77E216E0}">
+        <p14:section name="Practice Run 2b" id="{CAC7A062-AB6D-0345-9A4E-DC6A77E216E0}">
           <p14:sldIdLst>
             <p14:sldId id="558"/>
             <p14:sldId id="559"/>
@@ -247,7 +247,7 @@
           <a:p>
             <a:fld id="{5ACDFB13-8C7E-2148-B293-047F9641DD71}" type="datetimeFigureOut">
               <a:rPr lang="en-US" smtClean="0"/>
-              <a:t>2/13/23</a:t>
+              <a:t>2/27/23</a:t>
             </a:fld>
             <a:endParaRPr lang="en-US" dirty="0"/>
           </a:p>
@@ -1625,7 +1625,7 @@
           <a:p>
             <a:fld id="{E69A4D3A-6EF8-7448-AC6F-AD52FEDAA6A8}" type="datetimeFigureOut">
               <a:rPr lang="en-US" smtClean="0"/>
-              <a:t>2/13/23</a:t>
+              <a:t>2/27/23</a:t>
             </a:fld>
             <a:endParaRPr lang="en-US" dirty="0"/>
           </a:p>
@@ -1793,7 +1793,7 @@
           <a:p>
             <a:fld id="{E69A4D3A-6EF8-7448-AC6F-AD52FEDAA6A8}" type="datetimeFigureOut">
               <a:rPr lang="en-US" smtClean="0"/>
-              <a:t>2/13/23</a:t>
+              <a:t>2/27/23</a:t>
             </a:fld>
             <a:endParaRPr lang="en-US" dirty="0"/>
           </a:p>
@@ -1971,7 +1971,7 @@
           <a:p>
             <a:fld id="{E69A4D3A-6EF8-7448-AC6F-AD52FEDAA6A8}" type="datetimeFigureOut">
               <a:rPr lang="en-US" smtClean="0"/>
-              <a:t>2/13/23</a:t>
+              <a:t>2/27/23</a:t>
             </a:fld>
             <a:endParaRPr lang="en-US" dirty="0"/>
           </a:p>
@@ -2139,7 +2139,7 @@
           <a:p>
             <a:fld id="{E69A4D3A-6EF8-7448-AC6F-AD52FEDAA6A8}" type="datetimeFigureOut">
               <a:rPr lang="en-US" smtClean="0"/>
-              <a:t>2/13/23</a:t>
+              <a:t>2/27/23</a:t>
             </a:fld>
             <a:endParaRPr lang="en-US" dirty="0"/>
           </a:p>
@@ -2384,7 +2384,7 @@
           <a:p>
             <a:fld id="{E69A4D3A-6EF8-7448-AC6F-AD52FEDAA6A8}" type="datetimeFigureOut">
               <a:rPr lang="en-US" smtClean="0"/>
-              <a:t>2/13/23</a:t>
+              <a:t>2/27/23</a:t>
             </a:fld>
             <a:endParaRPr lang="en-US" dirty="0"/>
           </a:p>
@@ -2669,7 +2669,7 @@
           <a:p>
             <a:fld id="{E69A4D3A-6EF8-7448-AC6F-AD52FEDAA6A8}" type="datetimeFigureOut">
               <a:rPr lang="en-US" smtClean="0"/>
-              <a:t>2/13/23</a:t>
+              <a:t>2/27/23</a:t>
             </a:fld>
             <a:endParaRPr lang="en-US" dirty="0"/>
           </a:p>
@@ -3088,7 +3088,7 @@
           <a:p>
             <a:fld id="{E69A4D3A-6EF8-7448-AC6F-AD52FEDAA6A8}" type="datetimeFigureOut">
               <a:rPr lang="en-US" smtClean="0"/>
-              <a:t>2/13/23</a:t>
+              <a:t>2/27/23</a:t>
             </a:fld>
             <a:endParaRPr lang="en-US" dirty="0"/>
           </a:p>
@@ -3205,7 +3205,7 @@
           <a:p>
             <a:fld id="{E69A4D3A-6EF8-7448-AC6F-AD52FEDAA6A8}" type="datetimeFigureOut">
               <a:rPr lang="en-US" smtClean="0"/>
-              <a:t>2/13/23</a:t>
+              <a:t>2/27/23</a:t>
             </a:fld>
             <a:endParaRPr lang="en-US" dirty="0"/>
           </a:p>
@@ -3300,7 +3300,7 @@
           <a:p>
             <a:fld id="{E69A4D3A-6EF8-7448-AC6F-AD52FEDAA6A8}" type="datetimeFigureOut">
               <a:rPr lang="en-US" smtClean="0"/>
-              <a:t>2/13/23</a:t>
+              <a:t>2/27/23</a:t>
             </a:fld>
             <a:endParaRPr lang="en-US" dirty="0"/>
           </a:p>
@@ -3575,7 +3575,7 @@
           <a:p>
             <a:fld id="{E69A4D3A-6EF8-7448-AC6F-AD52FEDAA6A8}" type="datetimeFigureOut">
               <a:rPr lang="en-US" smtClean="0"/>
-              <a:t>2/13/23</a:t>
+              <a:t>2/27/23</a:t>
             </a:fld>
             <a:endParaRPr lang="en-US" dirty="0"/>
           </a:p>
@@ -3830,7 +3830,7 @@
           <a:p>
             <a:fld id="{E69A4D3A-6EF8-7448-AC6F-AD52FEDAA6A8}" type="datetimeFigureOut">
               <a:rPr lang="en-US" smtClean="0"/>
-              <a:t>2/13/23</a:t>
+              <a:t>2/27/23</a:t>
             </a:fld>
             <a:endParaRPr lang="en-US" dirty="0"/>
           </a:p>
@@ -4044,7 +4044,7 @@
           <a:p>
             <a:fld id="{E69A4D3A-6EF8-7448-AC6F-AD52FEDAA6A8}" type="datetimeFigureOut">
               <a:rPr lang="en-US" smtClean="0"/>
-              <a:t>2/13/23</a:t>
+              <a:t>2/27/23</a:t>
             </a:fld>
             <a:endParaRPr lang="en-US" dirty="0"/>
           </a:p>
@@ -4854,287 +4854,6 @@
           </a:p>
         </p:txBody>
       </p:sp>
-      <p:sp>
-        <p:nvSpPr>
-          <p:cNvPr id="7" name="Title 3"/>
-          <p:cNvSpPr txBox="1">
-            <a:spLocks/>
-          </p:cNvSpPr>
-          <p:nvPr/>
-        </p:nvSpPr>
-        <p:spPr>
-          <a:xfrm>
-            <a:off x="1524000" y="6201295"/>
-            <a:ext cx="9149174" cy="656705"/>
-          </a:xfrm>
-          <a:prstGeom prst="rect">
-            <a:avLst/>
-          </a:prstGeom>
-        </p:spPr>
-        <p:txBody>
-          <a:bodyPr vert="horz" lIns="91440" tIns="45720" rIns="91440" bIns="45720" rtlCol="0" anchor="ctr">
-            <a:normAutofit/>
-          </a:bodyPr>
-          <a:lstStyle>
-            <a:lvl1pPr algn="ctr" defTabSz="914400" rtl="0" eaLnBrk="1" latinLnBrk="0" hangingPunct="1">
-              <a:spcBef>
-                <a:spcPct val="0"/>
-              </a:spcBef>
-              <a:buNone/>
-              <a:defRPr sz="4400" kern="1200">
-                <a:solidFill>
-                  <a:schemeClr val="tx1"/>
-                </a:solidFill>
-                <a:latin typeface="+mj-lt"/>
-                <a:ea typeface="+mj-ea"/>
-                <a:cs typeface="+mj-cs"/>
-              </a:defRPr>
-            </a:lvl1pPr>
-          </a:lstStyle>
-          <a:p>
-            <a:r>
-              <a:rPr lang="en-US" sz="3000" dirty="0">
-                <a:solidFill>
-                  <a:srgbClr val="FF0000"/>
-                </a:solidFill>
-              </a:rPr>
-              <a:t>PRESS THE RIGHT BUTTON TO CONTINUE</a:t>
-            </a:r>
-          </a:p>
-        </p:txBody>
-      </p:sp>
-      <p:sp>
-        <p:nvSpPr>
-          <p:cNvPr id="12" name="Subtitle 8"/>
-          <p:cNvSpPr txBox="1">
-            <a:spLocks/>
-          </p:cNvSpPr>
-          <p:nvPr/>
-        </p:nvSpPr>
-        <p:spPr>
-          <a:xfrm>
-            <a:off x="9140345" y="6073844"/>
-            <a:ext cx="1532830" cy="801636"/>
-          </a:xfrm>
-          <a:prstGeom prst="rect">
-            <a:avLst/>
-          </a:prstGeom>
-        </p:spPr>
-        <p:txBody>
-          <a:bodyPr vert="horz" lIns="91440" tIns="45720" rIns="91440" bIns="45720" rtlCol="0">
-            <a:normAutofit/>
-          </a:bodyPr>
-          <a:lstStyle>
-            <a:lvl1pPr marL="0" indent="0" algn="ctr" defTabSz="914400" rtl="0" eaLnBrk="1" latinLnBrk="0" hangingPunct="1">
-              <a:spcBef>
-                <a:spcPct val="20000"/>
-              </a:spcBef>
-              <a:buFont typeface="Arial" pitchFamily="34" charset="0"/>
-              <a:buNone/>
-              <a:defRPr sz="3200" kern="1200">
-                <a:solidFill>
-                  <a:schemeClr val="tx1">
-                    <a:tint val="75000"/>
-                  </a:schemeClr>
-                </a:solidFill>
-                <a:latin typeface="+mn-lt"/>
-                <a:ea typeface="+mn-ea"/>
-                <a:cs typeface="+mn-cs"/>
-              </a:defRPr>
-            </a:lvl1pPr>
-            <a:lvl2pPr marL="457200" indent="0" algn="ctr" defTabSz="914400" rtl="0" eaLnBrk="1" latinLnBrk="0" hangingPunct="1">
-              <a:spcBef>
-                <a:spcPct val="20000"/>
-              </a:spcBef>
-              <a:buFont typeface="Arial" pitchFamily="34" charset="0"/>
-              <a:buNone/>
-              <a:defRPr sz="2800" kern="1200">
-                <a:solidFill>
-                  <a:schemeClr val="tx1">
-                    <a:tint val="75000"/>
-                  </a:schemeClr>
-                </a:solidFill>
-                <a:latin typeface="+mn-lt"/>
-                <a:ea typeface="+mn-ea"/>
-                <a:cs typeface="+mn-cs"/>
-              </a:defRPr>
-            </a:lvl2pPr>
-            <a:lvl3pPr marL="914400" indent="0" algn="ctr" defTabSz="914400" rtl="0" eaLnBrk="1" latinLnBrk="0" hangingPunct="1">
-              <a:spcBef>
-                <a:spcPct val="20000"/>
-              </a:spcBef>
-              <a:buFont typeface="Arial" pitchFamily="34" charset="0"/>
-              <a:buNone/>
-              <a:defRPr sz="2400" kern="1200">
-                <a:solidFill>
-                  <a:schemeClr val="tx1">
-                    <a:tint val="75000"/>
-                  </a:schemeClr>
-                </a:solidFill>
-                <a:latin typeface="+mn-lt"/>
-                <a:ea typeface="+mn-ea"/>
-                <a:cs typeface="+mn-cs"/>
-              </a:defRPr>
-            </a:lvl3pPr>
-            <a:lvl4pPr marL="1371600" indent="0" algn="ctr" defTabSz="914400" rtl="0" eaLnBrk="1" latinLnBrk="0" hangingPunct="1">
-              <a:spcBef>
-                <a:spcPct val="20000"/>
-              </a:spcBef>
-              <a:buFont typeface="Arial" pitchFamily="34" charset="0"/>
-              <a:buNone/>
-              <a:defRPr sz="2000" kern="1200">
-                <a:solidFill>
-                  <a:schemeClr val="tx1">
-                    <a:tint val="75000"/>
-                  </a:schemeClr>
-                </a:solidFill>
-                <a:latin typeface="+mn-lt"/>
-                <a:ea typeface="+mn-ea"/>
-                <a:cs typeface="+mn-cs"/>
-              </a:defRPr>
-            </a:lvl4pPr>
-            <a:lvl5pPr marL="1828800" indent="0" algn="ctr" defTabSz="914400" rtl="0" eaLnBrk="1" latinLnBrk="0" hangingPunct="1">
-              <a:spcBef>
-                <a:spcPct val="20000"/>
-              </a:spcBef>
-              <a:buFont typeface="Arial" pitchFamily="34" charset="0"/>
-              <a:buNone/>
-              <a:defRPr sz="2000" kern="1200">
-                <a:solidFill>
-                  <a:schemeClr val="tx1">
-                    <a:tint val="75000"/>
-                  </a:schemeClr>
-                </a:solidFill>
-                <a:latin typeface="+mn-lt"/>
-                <a:ea typeface="+mn-ea"/>
-                <a:cs typeface="+mn-cs"/>
-              </a:defRPr>
-            </a:lvl5pPr>
-            <a:lvl6pPr marL="2286000" indent="0" algn="ctr" defTabSz="914400" rtl="0" eaLnBrk="1" latinLnBrk="0" hangingPunct="1">
-              <a:spcBef>
-                <a:spcPct val="20000"/>
-              </a:spcBef>
-              <a:buFont typeface="Arial" pitchFamily="34" charset="0"/>
-              <a:buNone/>
-              <a:defRPr sz="2000" kern="1200">
-                <a:solidFill>
-                  <a:schemeClr val="tx1">
-                    <a:tint val="75000"/>
-                  </a:schemeClr>
-                </a:solidFill>
-                <a:latin typeface="+mn-lt"/>
-                <a:ea typeface="+mn-ea"/>
-                <a:cs typeface="+mn-cs"/>
-              </a:defRPr>
-            </a:lvl6pPr>
-            <a:lvl7pPr marL="2743200" indent="0" algn="ctr" defTabSz="914400" rtl="0" eaLnBrk="1" latinLnBrk="0" hangingPunct="1">
-              <a:spcBef>
-                <a:spcPct val="20000"/>
-              </a:spcBef>
-              <a:buFont typeface="Arial" pitchFamily="34" charset="0"/>
-              <a:buNone/>
-              <a:defRPr sz="2000" kern="1200">
-                <a:solidFill>
-                  <a:schemeClr val="tx1">
-                    <a:tint val="75000"/>
-                  </a:schemeClr>
-                </a:solidFill>
-                <a:latin typeface="+mn-lt"/>
-                <a:ea typeface="+mn-ea"/>
-                <a:cs typeface="+mn-cs"/>
-              </a:defRPr>
-            </a:lvl7pPr>
-            <a:lvl8pPr marL="3200400" indent="0" algn="ctr" defTabSz="914400" rtl="0" eaLnBrk="1" latinLnBrk="0" hangingPunct="1">
-              <a:spcBef>
-                <a:spcPct val="20000"/>
-              </a:spcBef>
-              <a:buFont typeface="Arial" pitchFamily="34" charset="0"/>
-              <a:buNone/>
-              <a:defRPr sz="2000" kern="1200">
-                <a:solidFill>
-                  <a:schemeClr val="tx1">
-                    <a:tint val="75000"/>
-                  </a:schemeClr>
-                </a:solidFill>
-                <a:latin typeface="+mn-lt"/>
-                <a:ea typeface="+mn-ea"/>
-                <a:cs typeface="+mn-cs"/>
-              </a:defRPr>
-            </a:lvl8pPr>
-            <a:lvl9pPr marL="3657600" indent="0" algn="ctr" defTabSz="914400" rtl="0" eaLnBrk="1" latinLnBrk="0" hangingPunct="1">
-              <a:spcBef>
-                <a:spcPct val="20000"/>
-              </a:spcBef>
-              <a:buFont typeface="Arial" pitchFamily="34" charset="0"/>
-              <a:buNone/>
-              <a:defRPr sz="2000" kern="1200">
-                <a:solidFill>
-                  <a:schemeClr val="tx1">
-                    <a:tint val="75000"/>
-                  </a:schemeClr>
-                </a:solidFill>
-                <a:latin typeface="+mn-lt"/>
-                <a:ea typeface="+mn-ea"/>
-                <a:cs typeface="+mn-cs"/>
-              </a:defRPr>
-            </a:lvl9pPr>
-          </a:lstStyle>
-          <a:p>
-            <a:r>
-              <a:rPr lang="en-US" sz="1600" dirty="0">
-                <a:solidFill>
-                  <a:schemeClr val="tx1"/>
-                </a:solidFill>
-              </a:rPr>
-              <a:t>RIGHT</a:t>
-            </a:r>
-          </a:p>
-        </p:txBody>
-      </p:sp>
-      <p:sp>
-        <p:nvSpPr>
-          <p:cNvPr id="13" name="Right Arrow 12"/>
-          <p:cNvSpPr/>
-          <p:nvPr/>
-        </p:nvSpPr>
-        <p:spPr>
-          <a:xfrm>
-            <a:off x="9637318" y="6391827"/>
-            <a:ext cx="640200" cy="289763"/>
-          </a:xfrm>
-          <a:prstGeom prst="rightArrow">
-            <a:avLst/>
-          </a:prstGeom>
-          <a:solidFill>
-            <a:schemeClr val="tx1"/>
-          </a:solidFill>
-          <a:ln>
-            <a:noFill/>
-          </a:ln>
-        </p:spPr>
-        <p:style>
-          <a:lnRef idx="1">
-            <a:schemeClr val="accent1"/>
-          </a:lnRef>
-          <a:fillRef idx="3">
-            <a:schemeClr val="accent1"/>
-          </a:fillRef>
-          <a:effectRef idx="2">
-            <a:schemeClr val="accent1"/>
-          </a:effectRef>
-          <a:fontRef idx="minor">
-            <a:schemeClr val="lt1"/>
-          </a:fontRef>
-        </p:style>
-        <p:txBody>
-          <a:bodyPr rtlCol="0" anchor="ctr"/>
-          <a:lstStyle/>
-          <a:p>
-            <a:pPr algn="ctr"/>
-            <a:endParaRPr lang="en-US"/>
-          </a:p>
-        </p:txBody>
-      </p:sp>
       <p:pic>
         <p:nvPicPr>
           <p:cNvPr id="9" name="Picture 8"/>
@@ -5196,11 +4915,331 @@
             <a:pPr algn="ctr"/>
             <a:r>
               <a:rPr lang="en-US" sz="2400" dirty="0"/>
-              <a:t>Practice Run 2</a:t>
-            </a:r>
-          </a:p>
-        </p:txBody>
-      </p:sp>
+              <a:t>Practice Run 2a</a:t>
+            </a:r>
+          </a:p>
+        </p:txBody>
+      </p:sp>
+      <p:sp>
+        <p:nvSpPr>
+          <p:cNvPr id="10" name="Title 3">
+            <a:extLst>
+              <a:ext uri="{FF2B5EF4-FFF2-40B4-BE49-F238E27FC236}">
+                <a16:creationId xmlns:a16="http://schemas.microsoft.com/office/drawing/2014/main" id="{5094A6B9-4613-4144-B290-6D38BEE9A37C}"/>
+              </a:ext>
+            </a:extLst>
+          </p:cNvPr>
+          <p:cNvSpPr txBox="1">
+            <a:spLocks/>
+          </p:cNvSpPr>
+          <p:nvPr/>
+        </p:nvSpPr>
+        <p:spPr>
+          <a:xfrm>
+            <a:off x="2570400" y="6146309"/>
+            <a:ext cx="7051200" cy="656705"/>
+          </a:xfrm>
+          <a:prstGeom prst="rect">
+            <a:avLst/>
+          </a:prstGeom>
+        </p:spPr>
+        <p:txBody>
+          <a:bodyPr vert="horz" lIns="91440" tIns="45720" rIns="91440" bIns="45720" rtlCol="0" anchor="ctr">
+            <a:normAutofit/>
+          </a:bodyPr>
+          <a:lstStyle>
+            <a:lvl1pPr algn="ctr" defTabSz="914400" rtl="0" eaLnBrk="1" latinLnBrk="0" hangingPunct="1">
+              <a:spcBef>
+                <a:spcPct val="0"/>
+              </a:spcBef>
+              <a:buNone/>
+              <a:defRPr sz="4400" kern="1200">
+                <a:solidFill>
+                  <a:schemeClr val="tx1"/>
+                </a:solidFill>
+                <a:latin typeface="+mj-lt"/>
+                <a:ea typeface="+mj-ea"/>
+                <a:cs typeface="+mj-cs"/>
+              </a:defRPr>
+            </a:lvl1pPr>
+          </a:lstStyle>
+          <a:p>
+            <a:r>
+              <a:rPr lang="en-US" sz="3000" dirty="0">
+                <a:solidFill>
+                  <a:srgbClr val="FF0000"/>
+                </a:solidFill>
+              </a:rPr>
+              <a:t>PRESS THE RIGHT BUTTON TO CONTINUE</a:t>
+            </a:r>
+          </a:p>
+        </p:txBody>
+      </p:sp>
+      <p:grpSp>
+        <p:nvGrpSpPr>
+          <p:cNvPr id="11" name="Group 10">
+            <a:extLst>
+              <a:ext uri="{FF2B5EF4-FFF2-40B4-BE49-F238E27FC236}">
+                <a16:creationId xmlns:a16="http://schemas.microsoft.com/office/drawing/2014/main" id="{6C70FEAB-29BA-D54D-8E0F-E51CCA2CA8A8}"/>
+              </a:ext>
+            </a:extLst>
+          </p:cNvPr>
+          <p:cNvGrpSpPr/>
+          <p:nvPr/>
+        </p:nvGrpSpPr>
+        <p:grpSpPr>
+          <a:xfrm>
+            <a:off x="9520995" y="6073844"/>
+            <a:ext cx="763676" cy="607746"/>
+            <a:chOff x="9520995" y="6073844"/>
+            <a:chExt cx="763676" cy="607746"/>
+          </a:xfrm>
+        </p:grpSpPr>
+        <p:sp>
+          <p:nvSpPr>
+            <p:cNvPr id="14" name="Subtitle 8">
+              <a:extLst>
+                <a:ext uri="{FF2B5EF4-FFF2-40B4-BE49-F238E27FC236}">
+                  <a16:creationId xmlns:a16="http://schemas.microsoft.com/office/drawing/2014/main" id="{7B0B96DB-6297-F440-9C49-ADCC0BE11051}"/>
+                </a:ext>
+              </a:extLst>
+            </p:cNvPr>
+            <p:cNvSpPr txBox="1">
+              <a:spLocks/>
+            </p:cNvSpPr>
+            <p:nvPr/>
+          </p:nvSpPr>
+          <p:spPr>
+            <a:xfrm>
+              <a:off x="9520995" y="6073844"/>
+              <a:ext cx="763676" cy="339358"/>
+            </a:xfrm>
+            <a:prstGeom prst="rect">
+              <a:avLst/>
+            </a:prstGeom>
+          </p:spPr>
+          <p:txBody>
+            <a:bodyPr vert="horz" lIns="91440" tIns="45720" rIns="91440" bIns="45720" rtlCol="0">
+              <a:normAutofit/>
+            </a:bodyPr>
+            <a:lstStyle>
+              <a:lvl1pPr marL="0" indent="0" algn="ctr" defTabSz="914400" rtl="0" eaLnBrk="1" latinLnBrk="0" hangingPunct="1">
+                <a:spcBef>
+                  <a:spcPct val="20000"/>
+                </a:spcBef>
+                <a:buFont typeface="Arial" pitchFamily="34" charset="0"/>
+                <a:buNone/>
+                <a:defRPr sz="3200" kern="1200">
+                  <a:solidFill>
+                    <a:schemeClr val="tx1">
+                      <a:tint val="75000"/>
+                    </a:schemeClr>
+                  </a:solidFill>
+                  <a:latin typeface="+mn-lt"/>
+                  <a:ea typeface="+mn-ea"/>
+                  <a:cs typeface="+mn-cs"/>
+                </a:defRPr>
+              </a:lvl1pPr>
+              <a:lvl2pPr marL="457200" indent="0" algn="ctr" defTabSz="914400" rtl="0" eaLnBrk="1" latinLnBrk="0" hangingPunct="1">
+                <a:spcBef>
+                  <a:spcPct val="20000"/>
+                </a:spcBef>
+                <a:buFont typeface="Arial" pitchFamily="34" charset="0"/>
+                <a:buNone/>
+                <a:defRPr sz="2800" kern="1200">
+                  <a:solidFill>
+                    <a:schemeClr val="tx1">
+                      <a:tint val="75000"/>
+                    </a:schemeClr>
+                  </a:solidFill>
+                  <a:latin typeface="+mn-lt"/>
+                  <a:ea typeface="+mn-ea"/>
+                  <a:cs typeface="+mn-cs"/>
+                </a:defRPr>
+              </a:lvl2pPr>
+              <a:lvl3pPr marL="914400" indent="0" algn="ctr" defTabSz="914400" rtl="0" eaLnBrk="1" latinLnBrk="0" hangingPunct="1">
+                <a:spcBef>
+                  <a:spcPct val="20000"/>
+                </a:spcBef>
+                <a:buFont typeface="Arial" pitchFamily="34" charset="0"/>
+                <a:buNone/>
+                <a:defRPr sz="2400" kern="1200">
+                  <a:solidFill>
+                    <a:schemeClr val="tx1">
+                      <a:tint val="75000"/>
+                    </a:schemeClr>
+                  </a:solidFill>
+                  <a:latin typeface="+mn-lt"/>
+                  <a:ea typeface="+mn-ea"/>
+                  <a:cs typeface="+mn-cs"/>
+                </a:defRPr>
+              </a:lvl3pPr>
+              <a:lvl4pPr marL="1371600" indent="0" algn="ctr" defTabSz="914400" rtl="0" eaLnBrk="1" latinLnBrk="0" hangingPunct="1">
+                <a:spcBef>
+                  <a:spcPct val="20000"/>
+                </a:spcBef>
+                <a:buFont typeface="Arial" pitchFamily="34" charset="0"/>
+                <a:buNone/>
+                <a:defRPr sz="2000" kern="1200">
+                  <a:solidFill>
+                    <a:schemeClr val="tx1">
+                      <a:tint val="75000"/>
+                    </a:schemeClr>
+                  </a:solidFill>
+                  <a:latin typeface="+mn-lt"/>
+                  <a:ea typeface="+mn-ea"/>
+                  <a:cs typeface="+mn-cs"/>
+                </a:defRPr>
+              </a:lvl4pPr>
+              <a:lvl5pPr marL="1828800" indent="0" algn="ctr" defTabSz="914400" rtl="0" eaLnBrk="1" latinLnBrk="0" hangingPunct="1">
+                <a:spcBef>
+                  <a:spcPct val="20000"/>
+                </a:spcBef>
+                <a:buFont typeface="Arial" pitchFamily="34" charset="0"/>
+                <a:buNone/>
+                <a:defRPr sz="2000" kern="1200">
+                  <a:solidFill>
+                    <a:schemeClr val="tx1">
+                      <a:tint val="75000"/>
+                    </a:schemeClr>
+                  </a:solidFill>
+                  <a:latin typeface="+mn-lt"/>
+                  <a:ea typeface="+mn-ea"/>
+                  <a:cs typeface="+mn-cs"/>
+                </a:defRPr>
+              </a:lvl5pPr>
+              <a:lvl6pPr marL="2286000" indent="0" algn="ctr" defTabSz="914400" rtl="0" eaLnBrk="1" latinLnBrk="0" hangingPunct="1">
+                <a:spcBef>
+                  <a:spcPct val="20000"/>
+                </a:spcBef>
+                <a:buFont typeface="Arial" pitchFamily="34" charset="0"/>
+                <a:buNone/>
+                <a:defRPr sz="2000" kern="1200">
+                  <a:solidFill>
+                    <a:schemeClr val="tx1">
+                      <a:tint val="75000"/>
+                    </a:schemeClr>
+                  </a:solidFill>
+                  <a:latin typeface="+mn-lt"/>
+                  <a:ea typeface="+mn-ea"/>
+                  <a:cs typeface="+mn-cs"/>
+                </a:defRPr>
+              </a:lvl6pPr>
+              <a:lvl7pPr marL="2743200" indent="0" algn="ctr" defTabSz="914400" rtl="0" eaLnBrk="1" latinLnBrk="0" hangingPunct="1">
+                <a:spcBef>
+                  <a:spcPct val="20000"/>
+                </a:spcBef>
+                <a:buFont typeface="Arial" pitchFamily="34" charset="0"/>
+                <a:buNone/>
+                <a:defRPr sz="2000" kern="1200">
+                  <a:solidFill>
+                    <a:schemeClr val="tx1">
+                      <a:tint val="75000"/>
+                    </a:schemeClr>
+                  </a:solidFill>
+                  <a:latin typeface="+mn-lt"/>
+                  <a:ea typeface="+mn-ea"/>
+                  <a:cs typeface="+mn-cs"/>
+                </a:defRPr>
+              </a:lvl7pPr>
+              <a:lvl8pPr marL="3200400" indent="0" algn="ctr" defTabSz="914400" rtl="0" eaLnBrk="1" latinLnBrk="0" hangingPunct="1">
+                <a:spcBef>
+                  <a:spcPct val="20000"/>
+                </a:spcBef>
+                <a:buFont typeface="Arial" pitchFamily="34" charset="0"/>
+                <a:buNone/>
+                <a:defRPr sz="2000" kern="1200">
+                  <a:solidFill>
+                    <a:schemeClr val="tx1">
+                      <a:tint val="75000"/>
+                    </a:schemeClr>
+                  </a:solidFill>
+                  <a:latin typeface="+mn-lt"/>
+                  <a:ea typeface="+mn-ea"/>
+                  <a:cs typeface="+mn-cs"/>
+                </a:defRPr>
+              </a:lvl8pPr>
+              <a:lvl9pPr marL="3657600" indent="0" algn="ctr" defTabSz="914400" rtl="0" eaLnBrk="1" latinLnBrk="0" hangingPunct="1">
+                <a:spcBef>
+                  <a:spcPct val="20000"/>
+                </a:spcBef>
+                <a:buFont typeface="Arial" pitchFamily="34" charset="0"/>
+                <a:buNone/>
+                <a:defRPr sz="2000" kern="1200">
+                  <a:solidFill>
+                    <a:schemeClr val="tx1">
+                      <a:tint val="75000"/>
+                    </a:schemeClr>
+                  </a:solidFill>
+                  <a:latin typeface="+mn-lt"/>
+                  <a:ea typeface="+mn-ea"/>
+                  <a:cs typeface="+mn-cs"/>
+                </a:defRPr>
+              </a:lvl9pPr>
+            </a:lstStyle>
+            <a:p>
+              <a:r>
+                <a:rPr lang="en-US" sz="1600" dirty="0">
+                  <a:solidFill>
+                    <a:schemeClr val="tx1"/>
+                  </a:solidFill>
+                </a:rPr>
+                <a:t>RIGHT</a:t>
+              </a:r>
+            </a:p>
+          </p:txBody>
+        </p:sp>
+        <p:sp>
+          <p:nvSpPr>
+            <p:cNvPr id="15" name="Right Arrow 14">
+              <a:extLst>
+                <a:ext uri="{FF2B5EF4-FFF2-40B4-BE49-F238E27FC236}">
+                  <a16:creationId xmlns:a16="http://schemas.microsoft.com/office/drawing/2014/main" id="{39FEFFB5-E53E-D24C-AEE4-9795386E538C}"/>
+                </a:ext>
+              </a:extLst>
+            </p:cNvPr>
+            <p:cNvSpPr/>
+            <p:nvPr/>
+          </p:nvSpPr>
+          <p:spPr>
+            <a:xfrm>
+              <a:off x="9637318" y="6391827"/>
+              <a:ext cx="640200" cy="289763"/>
+            </a:xfrm>
+            <a:prstGeom prst="rightArrow">
+              <a:avLst/>
+            </a:prstGeom>
+            <a:solidFill>
+              <a:schemeClr val="tx1"/>
+            </a:solidFill>
+            <a:ln>
+              <a:noFill/>
+            </a:ln>
+          </p:spPr>
+          <p:style>
+            <a:lnRef idx="1">
+              <a:schemeClr val="accent1"/>
+            </a:lnRef>
+            <a:fillRef idx="3">
+              <a:schemeClr val="accent1"/>
+            </a:fillRef>
+            <a:effectRef idx="2">
+              <a:schemeClr val="accent1"/>
+            </a:effectRef>
+            <a:fontRef idx="minor">
+              <a:schemeClr val="lt1"/>
+            </a:fontRef>
+          </p:style>
+          <p:txBody>
+            <a:bodyPr rtlCol="0" anchor="ctr"/>
+            <a:lstStyle/>
+            <a:p>
+              <a:pPr algn="ctr"/>
+              <a:endParaRPr lang="en-US"/>
+            </a:p>
+          </p:txBody>
+        </p:sp>
+      </p:grpSp>
     </p:spTree>
     <p:extLst>
       <p:ext uri="{BB962C8B-B14F-4D97-AF65-F5344CB8AC3E}">
@@ -5321,7 +5360,7 @@
             <a:pPr algn="ctr"/>
             <a:r>
               <a:rPr lang="en-US" sz="2400" dirty="0"/>
-              <a:t>Practice Run 2a</a:t>
+              <a:t>Practice Run 2b</a:t>
             </a:r>
           </a:p>
         </p:txBody>

</xml_diff>